<commit_message>
Edit BoardHandler class detail()
</commit_message>
<xml_diff>
--- a/study-note/자바/2022-09-15 내용정리.pptx
+++ b/study-note/자바/2022-09-15 내용정리.pptx
@@ -10915,6 +10915,815 @@
           <a:chExt cx="0" cy="0"/>
         </a:xfrm>
       </p:grpSpPr>
+      <p:cxnSp>
+        <p:nvCxnSpPr>
+          <p:cNvPr id="6" name="직선 화살표 연결선 5">
+            <a:extLst>
+              <a:ext uri="{FF2B5EF4-FFF2-40B4-BE49-F238E27FC236}">
+                <a16:creationId xmlns:a16="http://schemas.microsoft.com/office/drawing/2014/main" id="{18A6BBAB-C7EA-9535-BBD5-33891E6F097E}"/>
+              </a:ext>
+            </a:extLst>
+          </p:cNvPr>
+          <p:cNvCxnSpPr>
+            <a:cxnSpLocks/>
+            <a:stCxn id="2" idx="6"/>
+            <a:endCxn id="3" idx="2"/>
+          </p:cNvCxnSpPr>
+          <p:nvPr/>
+        </p:nvCxnSpPr>
+        <p:spPr>
+          <a:xfrm>
+            <a:off x="3030280" y="2488019"/>
+            <a:ext cx="4160875" cy="0"/>
+          </a:xfrm>
+          <a:prstGeom prst="straightConnector1">
+            <a:avLst/>
+          </a:prstGeom>
+          <a:ln>
+            <a:headEnd type="triangle"/>
+            <a:tailEnd type="triangle"/>
+          </a:ln>
+        </p:spPr>
+        <p:style>
+          <a:lnRef idx="3">
+            <a:schemeClr val="accent1"/>
+          </a:lnRef>
+          <a:fillRef idx="0">
+            <a:schemeClr val="accent1"/>
+          </a:fillRef>
+          <a:effectRef idx="2">
+            <a:schemeClr val="accent1"/>
+          </a:effectRef>
+          <a:fontRef idx="minor">
+            <a:schemeClr val="tx1"/>
+          </a:fontRef>
+        </p:style>
+      </p:cxnSp>
+      <p:sp>
+        <p:nvSpPr>
+          <p:cNvPr id="2" name="타원 1">
+            <a:extLst>
+              <a:ext uri="{FF2B5EF4-FFF2-40B4-BE49-F238E27FC236}">
+                <a16:creationId xmlns:a16="http://schemas.microsoft.com/office/drawing/2014/main" id="{81428D2E-70FE-2257-EF68-EE0DC91EDA84}"/>
+              </a:ext>
+            </a:extLst>
+          </p:cNvPr>
+          <p:cNvSpPr/>
+          <p:nvPr/>
+        </p:nvSpPr>
+        <p:spPr>
+          <a:xfrm>
+            <a:off x="1499192" y="1722475"/>
+            <a:ext cx="1531088" cy="1531088"/>
+          </a:xfrm>
+          <a:prstGeom prst="ellipse">
+            <a:avLst/>
+          </a:prstGeom>
+        </p:spPr>
+        <p:style>
+          <a:lnRef idx="2">
+            <a:schemeClr val="accent1">
+              <a:shade val="50000"/>
+            </a:schemeClr>
+          </a:lnRef>
+          <a:fillRef idx="1">
+            <a:schemeClr val="accent1"/>
+          </a:fillRef>
+          <a:effectRef idx="0">
+            <a:schemeClr val="accent1"/>
+          </a:effectRef>
+          <a:fontRef idx="minor">
+            <a:schemeClr val="lt1"/>
+          </a:fontRef>
+        </p:style>
+        <p:txBody>
+          <a:bodyPr rtlCol="0" anchor="ctr"/>
+          <a:lstStyle/>
+          <a:p>
+            <a:pPr algn="ctr"/>
+            <a:r>
+              <a:rPr kumimoji="1" lang="en-US" altLang="ko-Kore-KR" dirty="0"/>
+              <a:t>HTTP</a:t>
+            </a:r>
+          </a:p>
+          <a:p>
+            <a:pPr algn="ctr"/>
+            <a:r>
+              <a:rPr kumimoji="1" lang="en-US" altLang="ko-Kore-KR" dirty="0"/>
+              <a:t>Client</a:t>
+            </a:r>
+            <a:endParaRPr kumimoji="1" lang="ko-Kore-KR" altLang="en-US" dirty="0"/>
+          </a:p>
+        </p:txBody>
+      </p:sp>
+      <p:sp>
+        <p:nvSpPr>
+          <p:cNvPr id="3" name="타원 2">
+            <a:extLst>
+              <a:ext uri="{FF2B5EF4-FFF2-40B4-BE49-F238E27FC236}">
+                <a16:creationId xmlns:a16="http://schemas.microsoft.com/office/drawing/2014/main" id="{F4AB5A0E-6CEC-EED7-7128-397406F45C5A}"/>
+              </a:ext>
+            </a:extLst>
+          </p:cNvPr>
+          <p:cNvSpPr/>
+          <p:nvPr/>
+        </p:nvSpPr>
+        <p:spPr>
+          <a:xfrm>
+            <a:off x="7191155" y="1722475"/>
+            <a:ext cx="1531088" cy="1531088"/>
+          </a:xfrm>
+          <a:prstGeom prst="ellipse">
+            <a:avLst/>
+          </a:prstGeom>
+        </p:spPr>
+        <p:style>
+          <a:lnRef idx="2">
+            <a:schemeClr val="accent1">
+              <a:shade val="50000"/>
+            </a:schemeClr>
+          </a:lnRef>
+          <a:fillRef idx="1">
+            <a:schemeClr val="accent1"/>
+          </a:fillRef>
+          <a:effectRef idx="0">
+            <a:schemeClr val="accent1"/>
+          </a:effectRef>
+          <a:fontRef idx="minor">
+            <a:schemeClr val="lt1"/>
+          </a:fontRef>
+        </p:style>
+        <p:txBody>
+          <a:bodyPr rtlCol="0" anchor="ctr"/>
+          <a:lstStyle/>
+          <a:p>
+            <a:pPr algn="ctr"/>
+            <a:r>
+              <a:rPr kumimoji="1" lang="en-US" altLang="ko-Kore-KR" dirty="0"/>
+              <a:t>HTTP</a:t>
+            </a:r>
+          </a:p>
+          <a:p>
+            <a:pPr algn="ctr"/>
+            <a:r>
+              <a:rPr kumimoji="1" lang="en-US" altLang="ko-Kore-KR" dirty="0"/>
+              <a:t>Server</a:t>
+            </a:r>
+            <a:endParaRPr kumimoji="1" lang="ko-Kore-KR" altLang="en-US" dirty="0"/>
+          </a:p>
+        </p:txBody>
+      </p:sp>
+      <p:sp>
+        <p:nvSpPr>
+          <p:cNvPr id="5" name="TextBox 4">
+            <a:extLst>
+              <a:ext uri="{FF2B5EF4-FFF2-40B4-BE49-F238E27FC236}">
+                <a16:creationId xmlns:a16="http://schemas.microsoft.com/office/drawing/2014/main" id="{69F7A673-1C40-2D4D-937A-757300379F43}"/>
+              </a:ext>
+            </a:extLst>
+          </p:cNvPr>
+          <p:cNvSpPr txBox="1"/>
+          <p:nvPr/>
+        </p:nvSpPr>
+        <p:spPr>
+          <a:xfrm>
+            <a:off x="4389475" y="2172123"/>
+            <a:ext cx="1415902" cy="646331"/>
+          </a:xfrm>
+          <a:prstGeom prst="rect">
+            <a:avLst/>
+          </a:prstGeom>
+          <a:ln/>
+        </p:spPr>
+        <p:style>
+          <a:lnRef idx="3">
+            <a:schemeClr val="lt1"/>
+          </a:lnRef>
+          <a:fillRef idx="1">
+            <a:schemeClr val="accent2"/>
+          </a:fillRef>
+          <a:effectRef idx="1">
+            <a:schemeClr val="accent2"/>
+          </a:effectRef>
+          <a:fontRef idx="minor">
+            <a:schemeClr val="lt1"/>
+          </a:fontRef>
+        </p:style>
+        <p:txBody>
+          <a:bodyPr wrap="square" rtlCol="0">
+            <a:spAutoFit/>
+          </a:bodyPr>
+          <a:lstStyle/>
+          <a:p>
+            <a:pPr algn="ctr"/>
+            <a:r>
+              <a:rPr kumimoji="1" lang="en-US" altLang="ko-KR" b="1" dirty="0"/>
+              <a:t>HTTP</a:t>
+            </a:r>
+          </a:p>
+          <a:p>
+            <a:pPr algn="ctr"/>
+            <a:r>
+              <a:rPr kumimoji="1" lang="ko-KR" altLang="en-US" b="1" dirty="0"/>
+              <a:t>통신</a:t>
+            </a:r>
+            <a:endParaRPr kumimoji="1" lang="ko-Kore-KR" altLang="en-US" b="1" dirty="0"/>
+          </a:p>
+        </p:txBody>
+      </p:sp>
+      <p:sp>
+        <p:nvSpPr>
+          <p:cNvPr id="9" name="TextBox 8">
+            <a:extLst>
+              <a:ext uri="{FF2B5EF4-FFF2-40B4-BE49-F238E27FC236}">
+                <a16:creationId xmlns:a16="http://schemas.microsoft.com/office/drawing/2014/main" id="{80AE8777-CDD9-F6A6-E448-5469C58F4AC6}"/>
+              </a:ext>
+            </a:extLst>
+          </p:cNvPr>
+          <p:cNvSpPr txBox="1"/>
+          <p:nvPr/>
+        </p:nvSpPr>
+        <p:spPr>
+          <a:xfrm>
+            <a:off x="1578049" y="3604438"/>
+            <a:ext cx="1373373" cy="276999"/>
+          </a:xfrm>
+          <a:prstGeom prst="rect">
+            <a:avLst/>
+          </a:prstGeom>
+          <a:ln/>
+        </p:spPr>
+        <p:style>
+          <a:lnRef idx="2">
+            <a:schemeClr val="accent1"/>
+          </a:lnRef>
+          <a:fillRef idx="1">
+            <a:schemeClr val="lt1"/>
+          </a:fillRef>
+          <a:effectRef idx="0">
+            <a:schemeClr val="accent1"/>
+          </a:effectRef>
+          <a:fontRef idx="minor">
+            <a:schemeClr val="dk1"/>
+          </a:fontRef>
+        </p:style>
+        <p:txBody>
+          <a:bodyPr wrap="square" rtlCol="0">
+            <a:spAutoFit/>
+          </a:bodyPr>
+          <a:lstStyle/>
+          <a:p>
+            <a:pPr algn="ctr"/>
+            <a:r>
+              <a:rPr kumimoji="1" lang="en-US" altLang="ko-Kore-KR" sz="1200" dirty="0"/>
+              <a:t>Web Browser</a:t>
+            </a:r>
+            <a:endParaRPr kumimoji="1" lang="ko-Kore-KR" altLang="en-US" sz="1200" dirty="0"/>
+          </a:p>
+        </p:txBody>
+      </p:sp>
+      <p:sp>
+        <p:nvSpPr>
+          <p:cNvPr id="10" name="TextBox 9">
+            <a:extLst>
+              <a:ext uri="{FF2B5EF4-FFF2-40B4-BE49-F238E27FC236}">
+                <a16:creationId xmlns:a16="http://schemas.microsoft.com/office/drawing/2014/main" id="{BC97B6CF-47FD-D18A-C9F5-B3BFA647F5CE}"/>
+              </a:ext>
+            </a:extLst>
+          </p:cNvPr>
+          <p:cNvSpPr txBox="1"/>
+          <p:nvPr/>
+        </p:nvSpPr>
+        <p:spPr>
+          <a:xfrm>
+            <a:off x="7270012" y="3604437"/>
+            <a:ext cx="1373373" cy="276999"/>
+          </a:xfrm>
+          <a:prstGeom prst="rect">
+            <a:avLst/>
+          </a:prstGeom>
+          <a:ln/>
+        </p:spPr>
+        <p:style>
+          <a:lnRef idx="2">
+            <a:schemeClr val="accent1"/>
+          </a:lnRef>
+          <a:fillRef idx="1">
+            <a:schemeClr val="lt1"/>
+          </a:fillRef>
+          <a:effectRef idx="0">
+            <a:schemeClr val="accent1"/>
+          </a:effectRef>
+          <a:fontRef idx="minor">
+            <a:schemeClr val="dk1"/>
+          </a:fontRef>
+        </p:style>
+        <p:txBody>
+          <a:bodyPr wrap="square" rtlCol="0">
+            <a:spAutoFit/>
+          </a:bodyPr>
+          <a:lstStyle/>
+          <a:p>
+            <a:pPr algn="ctr"/>
+            <a:r>
+              <a:rPr kumimoji="1" lang="en-US" altLang="ko-Kore-KR" sz="1200" dirty="0"/>
+              <a:t>Web Server</a:t>
+            </a:r>
+            <a:endParaRPr kumimoji="1" lang="ko-Kore-KR" altLang="en-US" sz="1200" dirty="0"/>
+          </a:p>
+        </p:txBody>
+      </p:sp>
+      <p:cxnSp>
+        <p:nvCxnSpPr>
+          <p:cNvPr id="12" name="직선 화살표 연결선 11">
+            <a:extLst>
+              <a:ext uri="{FF2B5EF4-FFF2-40B4-BE49-F238E27FC236}">
+                <a16:creationId xmlns:a16="http://schemas.microsoft.com/office/drawing/2014/main" id="{5E6A91F5-C7FA-763F-ED11-37B10D430C83}"/>
+              </a:ext>
+            </a:extLst>
+          </p:cNvPr>
+          <p:cNvCxnSpPr>
+            <a:stCxn id="2" idx="4"/>
+            <a:endCxn id="9" idx="0"/>
+          </p:cNvCxnSpPr>
+          <p:nvPr/>
+        </p:nvCxnSpPr>
+        <p:spPr>
+          <a:xfrm>
+            <a:off x="2264736" y="3253563"/>
+            <a:ext cx="0" cy="350875"/>
+          </a:xfrm>
+          <a:prstGeom prst="straightConnector1">
+            <a:avLst/>
+          </a:prstGeom>
+          <a:ln>
+            <a:tailEnd type="triangle"/>
+          </a:ln>
+        </p:spPr>
+        <p:style>
+          <a:lnRef idx="3">
+            <a:schemeClr val="accent1"/>
+          </a:lnRef>
+          <a:fillRef idx="0">
+            <a:schemeClr val="accent1"/>
+          </a:fillRef>
+          <a:effectRef idx="2">
+            <a:schemeClr val="accent1"/>
+          </a:effectRef>
+          <a:fontRef idx="minor">
+            <a:schemeClr val="tx1"/>
+          </a:fontRef>
+        </p:style>
+      </p:cxnSp>
+      <p:cxnSp>
+        <p:nvCxnSpPr>
+          <p:cNvPr id="13" name="직선 화살표 연결선 12">
+            <a:extLst>
+              <a:ext uri="{FF2B5EF4-FFF2-40B4-BE49-F238E27FC236}">
+                <a16:creationId xmlns:a16="http://schemas.microsoft.com/office/drawing/2014/main" id="{CC5E0829-2A11-190A-F42B-2CE33F0957BE}"/>
+              </a:ext>
+            </a:extLst>
+          </p:cNvPr>
+          <p:cNvCxnSpPr>
+            <a:cxnSpLocks/>
+            <a:stCxn id="3" idx="4"/>
+            <a:endCxn id="10" idx="0"/>
+          </p:cNvCxnSpPr>
+          <p:nvPr/>
+        </p:nvCxnSpPr>
+        <p:spPr>
+          <a:xfrm>
+            <a:off x="7956699" y="3253563"/>
+            <a:ext cx="0" cy="350874"/>
+          </a:xfrm>
+          <a:prstGeom prst="straightConnector1">
+            <a:avLst/>
+          </a:prstGeom>
+          <a:ln>
+            <a:tailEnd type="triangle"/>
+          </a:ln>
+        </p:spPr>
+        <p:style>
+          <a:lnRef idx="3">
+            <a:schemeClr val="accent1"/>
+          </a:lnRef>
+          <a:fillRef idx="0">
+            <a:schemeClr val="accent1"/>
+          </a:fillRef>
+          <a:effectRef idx="2">
+            <a:schemeClr val="accent1"/>
+          </a:effectRef>
+          <a:fontRef idx="minor">
+            <a:schemeClr val="tx1"/>
+          </a:fontRef>
+        </p:style>
+      </p:cxnSp>
+      <p:sp>
+        <p:nvSpPr>
+          <p:cNvPr id="16" name="TextBox 15">
+            <a:extLst>
+              <a:ext uri="{FF2B5EF4-FFF2-40B4-BE49-F238E27FC236}">
+                <a16:creationId xmlns:a16="http://schemas.microsoft.com/office/drawing/2014/main" id="{104CE183-D61C-1B25-742D-7F87EA955008}"/>
+              </a:ext>
+            </a:extLst>
+          </p:cNvPr>
+          <p:cNvSpPr txBox="1"/>
+          <p:nvPr/>
+        </p:nvSpPr>
+        <p:spPr>
+          <a:xfrm>
+            <a:off x="985727" y="4231481"/>
+            <a:ext cx="2558016" cy="276999"/>
+          </a:xfrm>
+          <a:prstGeom prst="rect">
+            <a:avLst/>
+          </a:prstGeom>
+          <a:ln/>
+        </p:spPr>
+        <p:style>
+          <a:lnRef idx="2">
+            <a:schemeClr val="accent1"/>
+          </a:lnRef>
+          <a:fillRef idx="1">
+            <a:schemeClr val="lt1"/>
+          </a:fillRef>
+          <a:effectRef idx="0">
+            <a:schemeClr val="accent1"/>
+          </a:effectRef>
+          <a:fontRef idx="minor">
+            <a:schemeClr val="dk1"/>
+          </a:fontRef>
+        </p:style>
+        <p:txBody>
+          <a:bodyPr wrap="square" rtlCol="0">
+            <a:spAutoFit/>
+          </a:bodyPr>
+          <a:lstStyle/>
+          <a:p>
+            <a:pPr algn="ctr"/>
+            <a:r>
+              <a:rPr kumimoji="1" lang="en-US" altLang="ko-Kore-KR" sz="1200" dirty="0"/>
+              <a:t>(</a:t>
+            </a:r>
+            <a:r>
+              <a:rPr kumimoji="1" lang="ko-KR" altLang="en-US" sz="1200" dirty="0"/>
+              <a:t>거미줄과 같이 돌아다닐 수 있다</a:t>
+            </a:r>
+            <a:r>
+              <a:rPr kumimoji="1" lang="en-US" altLang="ko-KR" sz="1200" dirty="0"/>
+              <a:t>.</a:t>
+            </a:r>
+            <a:r>
+              <a:rPr kumimoji="1" lang="en-US" altLang="ko-Kore-KR" sz="1200" dirty="0"/>
+              <a:t>)</a:t>
+            </a:r>
+            <a:endParaRPr kumimoji="1" lang="ko-Kore-KR" altLang="en-US" sz="1200" dirty="0"/>
+          </a:p>
+        </p:txBody>
+      </p:sp>
+      <p:cxnSp>
+        <p:nvCxnSpPr>
+          <p:cNvPr id="18" name="직선 화살표 연결선 17">
+            <a:extLst>
+              <a:ext uri="{FF2B5EF4-FFF2-40B4-BE49-F238E27FC236}">
+                <a16:creationId xmlns:a16="http://schemas.microsoft.com/office/drawing/2014/main" id="{23DBD424-FA01-8A47-3D72-4D955B8EF2D5}"/>
+              </a:ext>
+            </a:extLst>
+          </p:cNvPr>
+          <p:cNvCxnSpPr>
+            <a:stCxn id="16" idx="0"/>
+            <a:endCxn id="9" idx="2"/>
+          </p:cNvCxnSpPr>
+          <p:nvPr/>
+        </p:nvCxnSpPr>
+        <p:spPr>
+          <a:xfrm flipV="1">
+            <a:off x="2264735" y="3881437"/>
+            <a:ext cx="1" cy="350044"/>
+          </a:xfrm>
+          <a:prstGeom prst="straightConnector1">
+            <a:avLst/>
+          </a:prstGeom>
+          <a:ln>
+            <a:tailEnd type="triangle"/>
+          </a:ln>
+        </p:spPr>
+        <p:style>
+          <a:lnRef idx="3">
+            <a:schemeClr val="accent1"/>
+          </a:lnRef>
+          <a:fillRef idx="0">
+            <a:schemeClr val="accent1"/>
+          </a:fillRef>
+          <a:effectRef idx="2">
+            <a:schemeClr val="accent1"/>
+          </a:effectRef>
+          <a:fontRef idx="minor">
+            <a:schemeClr val="tx1"/>
+          </a:fontRef>
+        </p:style>
+      </p:cxnSp>
+      <p:sp>
+        <p:nvSpPr>
+          <p:cNvPr id="19" name="타원 18">
+            <a:extLst>
+              <a:ext uri="{FF2B5EF4-FFF2-40B4-BE49-F238E27FC236}">
+                <a16:creationId xmlns:a16="http://schemas.microsoft.com/office/drawing/2014/main" id="{75326742-CDA4-AF71-D6BF-1B1D73E2C34A}"/>
+              </a:ext>
+            </a:extLst>
+          </p:cNvPr>
+          <p:cNvSpPr/>
+          <p:nvPr/>
+        </p:nvSpPr>
+        <p:spPr>
+          <a:xfrm>
+            <a:off x="6727751" y="4668244"/>
+            <a:ext cx="542261" cy="542261"/>
+          </a:xfrm>
+          <a:prstGeom prst="ellipse">
+            <a:avLst/>
+          </a:prstGeom>
+        </p:spPr>
+        <p:style>
+          <a:lnRef idx="2">
+            <a:schemeClr val="accent1">
+              <a:shade val="50000"/>
+            </a:schemeClr>
+          </a:lnRef>
+          <a:fillRef idx="1">
+            <a:schemeClr val="accent1"/>
+          </a:fillRef>
+          <a:effectRef idx="0">
+            <a:schemeClr val="accent1"/>
+          </a:effectRef>
+          <a:fontRef idx="minor">
+            <a:schemeClr val="lt1"/>
+          </a:fontRef>
+        </p:style>
+        <p:txBody>
+          <a:bodyPr rtlCol="0" anchor="ctr"/>
+          <a:lstStyle/>
+          <a:p>
+            <a:pPr algn="ctr"/>
+            <a:r>
+              <a:rPr kumimoji="1" lang="en-US" altLang="ko-Kore-KR" sz="1100" dirty="0"/>
+              <a:t>S1</a:t>
+            </a:r>
+            <a:endParaRPr kumimoji="1" lang="ko-Kore-KR" altLang="en-US" dirty="0"/>
+          </a:p>
+        </p:txBody>
+      </p:sp>
+      <p:sp>
+        <p:nvSpPr>
+          <p:cNvPr id="20" name="타원 19">
+            <a:extLst>
+              <a:ext uri="{FF2B5EF4-FFF2-40B4-BE49-F238E27FC236}">
+                <a16:creationId xmlns:a16="http://schemas.microsoft.com/office/drawing/2014/main" id="{6776F16A-6A17-A730-7D24-2F964608F5EB}"/>
+              </a:ext>
+            </a:extLst>
+          </p:cNvPr>
+          <p:cNvSpPr/>
+          <p:nvPr/>
+        </p:nvSpPr>
+        <p:spPr>
+          <a:xfrm>
+            <a:off x="8372254" y="5210505"/>
+            <a:ext cx="542261" cy="542261"/>
+          </a:xfrm>
+          <a:prstGeom prst="ellipse">
+            <a:avLst/>
+          </a:prstGeom>
+        </p:spPr>
+        <p:style>
+          <a:lnRef idx="2">
+            <a:schemeClr val="accent1">
+              <a:shade val="50000"/>
+            </a:schemeClr>
+          </a:lnRef>
+          <a:fillRef idx="1">
+            <a:schemeClr val="accent1"/>
+          </a:fillRef>
+          <a:effectRef idx="0">
+            <a:schemeClr val="accent1"/>
+          </a:effectRef>
+          <a:fontRef idx="minor">
+            <a:schemeClr val="lt1"/>
+          </a:fontRef>
+        </p:style>
+        <p:txBody>
+          <a:bodyPr rtlCol="0" anchor="ctr"/>
+          <a:lstStyle/>
+          <a:p>
+            <a:pPr algn="ctr"/>
+            <a:r>
+              <a:rPr kumimoji="1" lang="en-US" altLang="ko-Kore-KR" sz="1100" dirty="0"/>
+              <a:t>S1</a:t>
+            </a:r>
+            <a:endParaRPr kumimoji="1" lang="ko-Kore-KR" altLang="en-US" dirty="0"/>
+          </a:p>
+        </p:txBody>
+      </p:sp>
+      <p:sp>
+        <p:nvSpPr>
+          <p:cNvPr id="21" name="타원 20">
+            <a:extLst>
+              <a:ext uri="{FF2B5EF4-FFF2-40B4-BE49-F238E27FC236}">
+                <a16:creationId xmlns:a16="http://schemas.microsoft.com/office/drawing/2014/main" id="{E46C439C-1A1B-0FC8-E198-1B5A52262E0D}"/>
+              </a:ext>
+            </a:extLst>
+          </p:cNvPr>
+          <p:cNvSpPr/>
+          <p:nvPr/>
+        </p:nvSpPr>
+        <p:spPr>
+          <a:xfrm>
+            <a:off x="9910430" y="4125983"/>
+            <a:ext cx="542261" cy="542261"/>
+          </a:xfrm>
+          <a:prstGeom prst="ellipse">
+            <a:avLst/>
+          </a:prstGeom>
+        </p:spPr>
+        <p:style>
+          <a:lnRef idx="2">
+            <a:schemeClr val="accent1">
+              <a:shade val="50000"/>
+            </a:schemeClr>
+          </a:lnRef>
+          <a:fillRef idx="1">
+            <a:schemeClr val="accent1"/>
+          </a:fillRef>
+          <a:effectRef idx="0">
+            <a:schemeClr val="accent1"/>
+          </a:effectRef>
+          <a:fontRef idx="minor">
+            <a:schemeClr val="lt1"/>
+          </a:fontRef>
+        </p:style>
+        <p:txBody>
+          <a:bodyPr rtlCol="0" anchor="ctr"/>
+          <a:lstStyle/>
+          <a:p>
+            <a:pPr algn="ctr"/>
+            <a:r>
+              <a:rPr kumimoji="1" lang="en-US" altLang="ko-Kore-KR" sz="1100" dirty="0"/>
+              <a:t>S1</a:t>
+            </a:r>
+            <a:endParaRPr kumimoji="1" lang="ko-Kore-KR" altLang="en-US" dirty="0"/>
+          </a:p>
+        </p:txBody>
+      </p:sp>
+      <p:sp>
+        <p:nvSpPr>
+          <p:cNvPr id="22" name="타원 21">
+            <a:extLst>
+              <a:ext uri="{FF2B5EF4-FFF2-40B4-BE49-F238E27FC236}">
+                <a16:creationId xmlns:a16="http://schemas.microsoft.com/office/drawing/2014/main" id="{C6902EAF-CC64-6F63-157B-E487AE3C2B37}"/>
+              </a:ext>
+            </a:extLst>
+          </p:cNvPr>
+          <p:cNvSpPr/>
+          <p:nvPr/>
+        </p:nvSpPr>
+        <p:spPr>
+          <a:xfrm>
+            <a:off x="7028121" y="5883900"/>
+            <a:ext cx="542261" cy="542261"/>
+          </a:xfrm>
+          <a:prstGeom prst="ellipse">
+            <a:avLst/>
+          </a:prstGeom>
+        </p:spPr>
+        <p:style>
+          <a:lnRef idx="2">
+            <a:schemeClr val="accent1">
+              <a:shade val="50000"/>
+            </a:schemeClr>
+          </a:lnRef>
+          <a:fillRef idx="1">
+            <a:schemeClr val="accent1"/>
+          </a:fillRef>
+          <a:effectRef idx="0">
+            <a:schemeClr val="accent1"/>
+          </a:effectRef>
+          <a:fontRef idx="minor">
+            <a:schemeClr val="lt1"/>
+          </a:fontRef>
+        </p:style>
+        <p:txBody>
+          <a:bodyPr rtlCol="0" anchor="ctr"/>
+          <a:lstStyle/>
+          <a:p>
+            <a:pPr algn="ctr"/>
+            <a:r>
+              <a:rPr kumimoji="1" lang="en-US" altLang="ko-Kore-KR" sz="1100" dirty="0"/>
+              <a:t>S1</a:t>
+            </a:r>
+            <a:endParaRPr kumimoji="1" lang="ko-Kore-KR" altLang="en-US" dirty="0"/>
+          </a:p>
+        </p:txBody>
+      </p:sp>
+      <p:sp>
+        <p:nvSpPr>
+          <p:cNvPr id="23" name="타원 22">
+            <a:extLst>
+              <a:ext uri="{FF2B5EF4-FFF2-40B4-BE49-F238E27FC236}">
+                <a16:creationId xmlns:a16="http://schemas.microsoft.com/office/drawing/2014/main" id="{49927EBA-EA1E-D5C1-57FB-5FD213901A1D}"/>
+              </a:ext>
+            </a:extLst>
+          </p:cNvPr>
+          <p:cNvSpPr/>
+          <p:nvPr/>
+        </p:nvSpPr>
+        <p:spPr>
+          <a:xfrm>
+            <a:off x="10675974" y="5033295"/>
+            <a:ext cx="542261" cy="542261"/>
+          </a:xfrm>
+          <a:prstGeom prst="ellipse">
+            <a:avLst/>
+          </a:prstGeom>
+        </p:spPr>
+        <p:style>
+          <a:lnRef idx="2">
+            <a:schemeClr val="accent1">
+              <a:shade val="50000"/>
+            </a:schemeClr>
+          </a:lnRef>
+          <a:fillRef idx="1">
+            <a:schemeClr val="accent1"/>
+          </a:fillRef>
+          <a:effectRef idx="0">
+            <a:schemeClr val="accent1"/>
+          </a:effectRef>
+          <a:fontRef idx="minor">
+            <a:schemeClr val="lt1"/>
+          </a:fontRef>
+        </p:style>
+        <p:txBody>
+          <a:bodyPr rtlCol="0" anchor="ctr"/>
+          <a:lstStyle/>
+          <a:p>
+            <a:pPr algn="ctr"/>
+            <a:r>
+              <a:rPr kumimoji="1" lang="en-US" altLang="ko-Kore-KR" sz="1100" dirty="0"/>
+              <a:t>S1</a:t>
+            </a:r>
+            <a:endParaRPr kumimoji="1" lang="ko-Kore-KR" altLang="en-US" dirty="0"/>
+          </a:p>
+        </p:txBody>
+      </p:sp>
+      <p:sp>
+        <p:nvSpPr>
+          <p:cNvPr id="25" name="TextBox 24">
+            <a:extLst>
+              <a:ext uri="{FF2B5EF4-FFF2-40B4-BE49-F238E27FC236}">
+                <a16:creationId xmlns:a16="http://schemas.microsoft.com/office/drawing/2014/main" id="{C21478EB-EE98-2B39-30C9-DE9A9B68A551}"/>
+              </a:ext>
+            </a:extLst>
+          </p:cNvPr>
+          <p:cNvSpPr txBox="1"/>
+          <p:nvPr/>
+        </p:nvSpPr>
+        <p:spPr>
+          <a:xfrm>
+            <a:off x="4133407" y="5745400"/>
+            <a:ext cx="1373373" cy="276999"/>
+          </a:xfrm>
+          <a:prstGeom prst="rect">
+            <a:avLst/>
+          </a:prstGeom>
+          <a:ln/>
+        </p:spPr>
+        <p:style>
+          <a:lnRef idx="2">
+            <a:schemeClr val="accent1"/>
+          </a:lnRef>
+          <a:fillRef idx="1">
+            <a:schemeClr val="lt1"/>
+          </a:fillRef>
+          <a:effectRef idx="0">
+            <a:schemeClr val="accent1"/>
+          </a:effectRef>
+          <a:fontRef idx="minor">
+            <a:schemeClr val="dk1"/>
+          </a:fontRef>
+        </p:style>
+        <p:txBody>
+          <a:bodyPr wrap="square" rtlCol="0">
+            <a:spAutoFit/>
+          </a:bodyPr>
+          <a:lstStyle/>
+          <a:p>
+            <a:pPr algn="ctr"/>
+            <a:r>
+              <a:rPr kumimoji="1" lang="en-US" altLang="ko-Kore-KR" sz="1200"/>
+              <a:t>Web Client</a:t>
+            </a:r>
+            <a:endParaRPr kumimoji="1" lang="ko-Kore-KR" altLang="en-US" sz="1200" dirty="0"/>
+          </a:p>
+        </p:txBody>
+      </p:sp>
     </p:spTree>
     <p:extLst>
       <p:ext uri="{BB962C8B-B14F-4D97-AF65-F5344CB8AC3E}">

</xml_diff>